<commit_message>
modified and updated ppt
title correction in homepage
+ minor things
</commit_message>
<xml_diff>
--- a/Review PPTs/0-REVIEW PPT.pptx
+++ b/Review PPTs/0-REVIEW PPT.pptx
@@ -5518,13 +5518,13 @@
               <a:t>M.Tech</a:t>
             </a:r>
             <a:r>
-              <a:rPr lang="en-US" sz="1400" spc="-1" dirty="0" err="1">
+              <a:rPr lang="en-US" sz="1400" spc="-1" dirty="0">
                 <a:solidFill>
                   <a:srgbClr val="000000"/>
                 </a:solidFill>
                 <a:latin typeface="Times New Roman"/>
               </a:rPr>
-              <a:t>,</a:t>
+              <a:t>, </a:t>
             </a:r>
             <a:r>
               <a:rPr lang="en-US" sz="1400" b="0" strike="noStrike" spc="-1" dirty="0" err="1">
@@ -6053,15 +6053,15 @@
               </a:lnSpc>
             </a:pPr>
             <a:r>
-              <a:rPr lang="en-IN" sz="3200" spc="-1" dirty="0">
+              <a:rPr lang="en-IN" sz="3120" spc="-1" dirty="0">
                 <a:solidFill>
                   <a:srgbClr val="FFFFFF"/>
                 </a:solidFill>
                 <a:latin typeface="Times New Roman"/>
               </a:rPr>
-              <a:t>Decentralized Traceability and Direct Selling of Agriculture supply chain</a:t>
-            </a:r>
-            <a:endParaRPr lang="en-IN" sz="3200" b="0" strike="noStrike" spc="-1" dirty="0">
+              <a:t>Decentralized Traceability and Direct Selling of Agriculture Supply Chains</a:t>
+            </a:r>
+            <a:endParaRPr lang="en-IN" sz="3120" b="0" strike="noStrike" spc="-1" dirty="0">
               <a:latin typeface="Arial"/>
             </a:endParaRPr>
           </a:p>
@@ -6329,22 +6329,13 @@
               </a:lnSpc>
             </a:pPr>
             <a:r>
-              <a:rPr lang="en-IN" sz="4400" b="0" strike="noStrike" spc="-1" dirty="0" err="1">
-                <a:solidFill>
-                  <a:srgbClr val="FFFFFF"/>
-                </a:solidFill>
-                <a:latin typeface="Times New Roman"/>
-              </a:rPr>
-              <a:t>Github</a:t>
-            </a:r>
-            <a:r>
               <a:rPr lang="en-IN" sz="4400" b="0" strike="noStrike" spc="-1" dirty="0">
                 <a:solidFill>
                   <a:srgbClr val="FFFFFF"/>
                 </a:solidFill>
                 <a:latin typeface="Times New Roman"/>
               </a:rPr>
-              <a:t> Dashboards of each student</a:t>
+              <a:t>GitHub Dashboards of each student</a:t>
             </a:r>
             <a:endParaRPr lang="en-US" sz="4400" b="0" strike="noStrike" spc="-1" dirty="0">
               <a:solidFill>

</xml_diff>

<commit_message>
Removed Dr. with Mr. and add Block chain Technology Url.
</commit_message>
<xml_diff>
--- a/Review PPTs/0-REVIEW PPT.pptx
+++ b/Review PPTs/0-REVIEW PPT.pptx
@@ -5473,13 +5473,22 @@
               </a:tabLst>
             </a:pPr>
             <a:r>
+              <a:rPr lang="en-US" sz="2400" spc="-1" dirty="0">
+                <a:solidFill>
+                  <a:srgbClr val="000000"/>
+                </a:solidFill>
+                <a:latin typeface="Times New Roman"/>
+              </a:rPr>
+              <a:t>Mr.</a:t>
+            </a:r>
+            <a:r>
               <a:rPr lang="en-US" sz="2400" b="0" strike="noStrike" spc="-1" dirty="0">
                 <a:solidFill>
                   <a:srgbClr val="000000"/>
                 </a:solidFill>
                 <a:latin typeface="Times New Roman"/>
               </a:rPr>
-              <a:t>Dr. </a:t>
+              <a:t> </a:t>
             </a:r>
             <a:r>
               <a:rPr lang="en-US" sz="2400" spc="-1" dirty="0">
@@ -5524,7 +5533,7 @@
                 </a:solidFill>
                 <a:latin typeface="Times New Roman"/>
               </a:rPr>
-              <a:t>, </a:t>
+              <a:t>, (</a:t>
             </a:r>
             <a:r>
               <a:rPr lang="en-US" sz="1400" b="0" strike="noStrike" spc="-1" dirty="0" err="1">
@@ -5534,6 +5543,15 @@
                 <a:latin typeface="Times New Roman"/>
               </a:rPr>
               <a:t>Ph.D</a:t>
+            </a:r>
+            <a:r>
+              <a:rPr lang="en-US" sz="1400" b="0" strike="noStrike" spc="-1" dirty="0">
+                <a:solidFill>
+                  <a:srgbClr val="000000"/>
+                </a:solidFill>
+                <a:latin typeface="Times New Roman"/>
+              </a:rPr>
+              <a:t>)</a:t>
             </a:r>
             <a:endParaRPr lang="en-IN" sz="1400" b="0" strike="noStrike" spc="-1" dirty="0">
               <a:latin typeface="Arial"/>
@@ -6841,7 +6859,7 @@
         </p:nvSpPr>
         <p:spPr>
           <a:xfrm>
-            <a:off x="0" y="232920"/>
+            <a:off x="240" y="220728"/>
             <a:ext cx="12191760" cy="714600"/>
           </a:xfrm>
           <a:prstGeom prst="rect">
@@ -6867,29 +6885,16 @@
           </a:bodyPr>
           <a:lstStyle/>
           <a:p>
-            <a:pPr algn="ctr">
-              <a:lnSpc>
-                <a:spcPct val="90000"/>
-              </a:lnSpc>
-              <a:spcBef>
-                <a:spcPts val="1001"/>
-              </a:spcBef>
-            </a:pPr>
-            <a:r>
-              <a:rPr lang="en-US" sz="2800" b="0" strike="noStrike" spc="-1">
+            <a:pPr algn="ctr"/>
+            <a:r>
+              <a:rPr lang="en-US" spc="-1" dirty="0">
                 <a:solidFill>
-                  <a:srgbClr val="000000"/>
+                  <a:srgbClr val="FFFFFF"/>
                 </a:solidFill>
                 <a:latin typeface="Times New Roman"/>
               </a:rPr>
               <a:t>Abstract</a:t>
             </a:r>
-            <a:endParaRPr lang="en-US" sz="2800" b="0" strike="noStrike" spc="-1">
-              <a:solidFill>
-                <a:srgbClr val="000000"/>
-              </a:solidFill>
-              <a:latin typeface="Calibri"/>
-            </a:endParaRPr>
           </a:p>
         </p:txBody>
       </p:sp>
@@ -7053,7 +7058,7 @@
               </a:lnSpc>
             </a:pPr>
             <a:r>
-              <a:rPr lang="en-US" sz="4400" b="0" strike="noStrike" spc="-1">
+              <a:rPr lang="en-US" sz="4400" b="0" strike="noStrike" spc="-1" dirty="0">
                 <a:solidFill>
                   <a:srgbClr val="FFFFFF"/>
                 </a:solidFill>
@@ -7061,7 +7066,7 @@
               </a:rPr>
               <a:t>Problem Statement</a:t>
             </a:r>
-            <a:endParaRPr lang="en-US" sz="4400" b="0" strike="noStrike" spc="-1">
+            <a:endParaRPr lang="en-US" sz="4400" b="0" strike="noStrike" spc="-1" dirty="0">
               <a:solidFill>
                 <a:srgbClr val="000000"/>
               </a:solidFill>

</xml_diff>

<commit_message>
use [1] as number format for refernces and remove solid circle bullets
</commit_message>
<xml_diff>
--- a/Review PPTs/0-REVIEW PPT.pptx
+++ b/Review PPTs/0-REVIEW PPT.pptx
@@ -8111,20 +8111,22 @@
           </a:bodyPr>
           <a:lstStyle/>
           <a:p>
-            <a:pPr marL="577800" indent="-577800" algn="just">
+            <a:pPr marL="514350" indent="-514350" algn="just">
               <a:lnSpc>
                 <a:spcPct val="90000"/>
               </a:lnSpc>
               <a:spcBef>
                 <a:spcPts val="1001"/>
               </a:spcBef>
+              <a:buFont typeface="+mj-lt"/>
+              <a:buAutoNum type="arabicPeriod"/>
               <a:tabLst>
                 <a:tab pos="0" algn="l"/>
               </a:tabLst>
             </a:pPr>
             <a:r>
               <a:rPr lang="en-US" dirty="0"/>
-              <a:t>[1] M. M. Aung and Y. S. Chang, ``Traceability in a food supply chain: Safety and quality perspectives,'' Food Control, vol. 39, pp. 172_184, May 2014. </a:t>
+              <a:t>M. M. Aung and Y. S. Chang, ``Traceability in a food supply chain: Safety and quality perspectives,'' Food Control, vol. 39, pp. 172_184, May 2014. </a:t>
             </a:r>
           </a:p>
           <a:p>
@@ -8150,7 +8152,98 @@
                 </a:solidFill>
                 <a:latin typeface="Times New Roman"/>
               </a:rPr>
-              <a:t>                                  </a:t>
+              <a:t>   </a:t>
+            </a:r>
+          </a:p>
+          <a:p>
+            <a:pPr marL="0" indent="0" algn="just">
+              <a:lnSpc>
+                <a:spcPct val="90000"/>
+              </a:lnSpc>
+              <a:spcBef>
+                <a:spcPts val="1001"/>
+              </a:spcBef>
+              <a:buNone/>
+              <a:tabLst>
+                <a:tab pos="0" algn="l"/>
+              </a:tabLst>
+            </a:pPr>
+            <a:endParaRPr lang="en-US" spc="-1" dirty="0">
+              <a:solidFill>
+                <a:srgbClr val="000000"/>
+              </a:solidFill>
+              <a:latin typeface="Times New Roman"/>
+            </a:endParaRPr>
+          </a:p>
+          <a:p>
+            <a:pPr marL="0" indent="0" algn="just">
+              <a:spcBef>
+                <a:spcPts val="1001"/>
+              </a:spcBef>
+              <a:buNone/>
+              <a:tabLst>
+                <a:tab pos="0" algn="l"/>
+              </a:tabLst>
+            </a:pPr>
+            <a:r>
+              <a:rPr lang="en-US" sz="3200" kern="100" dirty="0">
+                <a:effectLst/>
+                <a:latin typeface="Calibri" panose="020F0502020204030204" pitchFamily="34" charset="0"/>
+                <a:ea typeface="Calibri" panose="020F0502020204030204" pitchFamily="34" charset="0"/>
+                <a:cs typeface="Times New Roman" panose="02020603050405020304" pitchFamily="18" charset="0"/>
+              </a:rPr>
+              <a:t>[1] M. M. Aung and Y. S. Chang, “</a:t>
+            </a:r>
+            <a:r>
+              <a:rPr lang="en-US" sz="3200" u="sng" kern="100" dirty="0">
+                <a:solidFill>
+                  <a:srgbClr val="0563C1"/>
+                </a:solidFill>
+                <a:effectLst/>
+                <a:latin typeface="Calibri" panose="020F0502020204030204" pitchFamily="34" charset="0"/>
+                <a:ea typeface="Calibri" panose="020F0502020204030204" pitchFamily="34" charset="0"/>
+                <a:cs typeface="Times New Roman" panose="02020603050405020304" pitchFamily="18" charset="0"/>
+                <a:hlinkClick r:id="rId2"/>
+              </a:rPr>
+              <a:t>Traceability in a food supply chain: Safety and quality perspectives,</a:t>
+            </a:r>
+            <a:r>
+              <a:rPr lang="en-US" sz="3200" kern="100" dirty="0">
+                <a:effectLst/>
+                <a:latin typeface="Calibri" panose="020F0502020204030204" pitchFamily="34" charset="0"/>
+                <a:ea typeface="Calibri" panose="020F0502020204030204" pitchFamily="34" charset="0"/>
+                <a:cs typeface="Times New Roman" panose="02020603050405020304" pitchFamily="18" charset="0"/>
+              </a:rPr>
+              <a:t>” Food Control, vol. 39, pp. 172_184, May 2014.</a:t>
+            </a:r>
+            <a:endParaRPr lang="en-IN" sz="3200" kern="100" dirty="0">
+              <a:effectLst/>
+              <a:latin typeface="Calibri" panose="020F0502020204030204" pitchFamily="34" charset="0"/>
+              <a:ea typeface="Calibri" panose="020F0502020204030204" pitchFamily="34" charset="0"/>
+              <a:cs typeface="Times New Roman" panose="02020603050405020304" pitchFamily="18" charset="0"/>
+            </a:endParaRPr>
+          </a:p>
+          <a:p>
+            <a:pPr marL="0" indent="0" algn="just">
+              <a:lnSpc>
+                <a:spcPct val="90000"/>
+              </a:lnSpc>
+              <a:spcBef>
+                <a:spcPts val="1001"/>
+              </a:spcBef>
+              <a:buNone/>
+              <a:tabLst>
+                <a:tab pos="0" algn="l"/>
+              </a:tabLst>
+            </a:pPr>
+            <a:r>
+              <a:rPr lang="en-US" sz="4400" b="0" strike="noStrike" spc="-1" dirty="0">
+                <a:solidFill>
+                  <a:srgbClr val="000000"/>
+                </a:solidFill>
+                <a:latin typeface="Times New Roman"/>
+              </a:rPr>
+              <a:t>                               </a:t>
             </a:r>
           </a:p>
           <a:p>

</xml_diff>